<commit_message>
html dynamic map rendering test
</commit_message>
<xml_diff>
--- a/output_files/CU_report_from_pptx.pptx
+++ b/output_files/CU_report_from_pptx.pptx
@@ -7966,7 +7966,7 @@
       </p:pic>
       <p:pic>
         <p:nvPicPr>
-          <p:cNvPr id="100" name="Picture 99" descr="image.png"/>
+          <p:cNvPr id="100" name="Picture 99" descr="image.jpg"/>
           <p:cNvPicPr>
             <a:picLocks noChangeAspect="1"/>
           </p:cNvPicPr>
@@ -8021,7 +8021,7 @@
           <p:nvPr/>
         </p:nvPicPr>
         <p:blipFill>
-          <a:blip r:embed="rId6"/>
+          <a:blip r:embed="rId8"/>
           <a:stretch>
             <a:fillRect/>
           </a:stretch>

</xml_diff>